<commit_message>
- Second draft of proposal
</commit_message>
<xml_diff>
--- a/TempestPipeline.pptx
+++ b/TempestPipeline.pptx
@@ -4021,10 +4021,10 @@
           <a:p>
             <a:pPr algn="ctr"/>
             <a:r>
-              <a:rPr lang="en-US" dirty="0" smtClean="0"/>
+              <a:rPr lang="en-US" b="1" dirty="0" smtClean="0"/>
               <a:t>Extreme Weather Pipeline</a:t>
             </a:r>
-            <a:endParaRPr lang="en-US" dirty="0"/>
+            <a:endParaRPr lang="en-US" b="1" dirty="0"/>
           </a:p>
         </p:txBody>
       </p:sp>
@@ -4111,64 +4111,6 @@
           <a:p>
             <a:pPr algn="ctr"/>
             <a:endParaRPr lang="en-US"/>
-          </a:p>
-        </p:txBody>
-      </p:sp>
-      <p:sp>
-        <p:nvSpPr>
-          <p:cNvPr id="12" name="Rounded Rectangle 11"/>
-          <p:cNvSpPr/>
-          <p:nvPr/>
-        </p:nvSpPr>
-        <p:spPr>
-          <a:xfrm>
-            <a:off x="892101" y="1307724"/>
-            <a:ext cx="2207564" cy="544259"/>
-          </a:xfrm>
-          <a:prstGeom prst="roundRect">
-            <a:avLst/>
-          </a:prstGeom>
-          <a:solidFill>
-            <a:schemeClr val="bg1"/>
-          </a:solidFill>
-          <a:ln>
-            <a:solidFill>
-              <a:srgbClr val="000000"/>
-            </a:solidFill>
-          </a:ln>
-        </p:spPr>
-        <p:style>
-          <a:lnRef idx="1">
-            <a:schemeClr val="accent1"/>
-          </a:lnRef>
-          <a:fillRef idx="3">
-            <a:schemeClr val="accent1"/>
-          </a:fillRef>
-          <a:effectRef idx="2">
-            <a:schemeClr val="accent1"/>
-          </a:effectRef>
-          <a:fontRef idx="minor">
-            <a:schemeClr val="lt1"/>
-          </a:fontRef>
-        </p:style>
-        <p:txBody>
-          <a:bodyPr rtlCol="0" anchor="ctr"/>
-          <a:lstStyle/>
-          <a:p>
-            <a:pPr algn="ctr"/>
-            <a:r>
-              <a:rPr lang="en-US" dirty="0" smtClean="0">
-                <a:solidFill>
-                  <a:schemeClr val="tx1"/>
-                </a:solidFill>
-              </a:rPr>
-              <a:t>Climate Model Data</a:t>
-            </a:r>
-            <a:endParaRPr lang="en-US" dirty="0">
-              <a:solidFill>
-                <a:schemeClr val="tx1"/>
-              </a:solidFill>
-            </a:endParaRPr>
           </a:p>
         </p:txBody>
       </p:sp>
@@ -4354,6 +4296,165 @@
           </a:p>
         </p:txBody>
       </p:sp>
+      <p:sp>
+        <p:nvSpPr>
+          <p:cNvPr id="12" name="Rounded Rectangle 11"/>
+          <p:cNvSpPr/>
+          <p:nvPr/>
+        </p:nvSpPr>
+        <p:spPr>
+          <a:xfrm>
+            <a:off x="892101" y="1307723"/>
+            <a:ext cx="2207564" cy="544259"/>
+          </a:xfrm>
+          <a:prstGeom prst="roundRect">
+            <a:avLst/>
+          </a:prstGeom>
+          <a:solidFill>
+            <a:schemeClr val="bg1"/>
+          </a:solidFill>
+          <a:ln>
+            <a:solidFill>
+              <a:srgbClr val="000000"/>
+            </a:solidFill>
+          </a:ln>
+        </p:spPr>
+        <p:style>
+          <a:lnRef idx="1">
+            <a:schemeClr val="accent1"/>
+          </a:lnRef>
+          <a:fillRef idx="3">
+            <a:schemeClr val="accent1"/>
+          </a:fillRef>
+          <a:effectRef idx="2">
+            <a:schemeClr val="accent1"/>
+          </a:effectRef>
+          <a:fontRef idx="minor">
+            <a:schemeClr val="lt1"/>
+          </a:fontRef>
+        </p:style>
+        <p:txBody>
+          <a:bodyPr rtlCol="0" anchor="ctr"/>
+          <a:lstStyle/>
+          <a:p>
+            <a:pPr algn="ctr"/>
+            <a:r>
+              <a:rPr lang="en-US" dirty="0" smtClean="0">
+                <a:solidFill>
+                  <a:schemeClr val="tx1"/>
+                </a:solidFill>
+              </a:rPr>
+              <a:t>Climate Data</a:t>
+            </a:r>
+            <a:endParaRPr lang="en-US" dirty="0">
+              <a:solidFill>
+                <a:schemeClr val="tx1"/>
+              </a:solidFill>
+            </a:endParaRPr>
+          </a:p>
+        </p:txBody>
+      </p:sp>
+      <p:sp>
+        <p:nvSpPr>
+          <p:cNvPr id="24" name="Right Arrow 23"/>
+          <p:cNvSpPr/>
+          <p:nvPr/>
+        </p:nvSpPr>
+        <p:spPr>
+          <a:xfrm rot="16200000">
+            <a:off x="1756567" y="4365374"/>
+            <a:ext cx="492556" cy="379193"/>
+          </a:xfrm>
+          <a:prstGeom prst="rightArrow">
+            <a:avLst/>
+          </a:prstGeom>
+          <a:ln>
+            <a:solidFill>
+              <a:srgbClr val="000000"/>
+            </a:solidFill>
+          </a:ln>
+        </p:spPr>
+        <p:style>
+          <a:lnRef idx="1">
+            <a:schemeClr val="accent1"/>
+          </a:lnRef>
+          <a:fillRef idx="3">
+            <a:schemeClr val="accent1"/>
+          </a:fillRef>
+          <a:effectRef idx="2">
+            <a:schemeClr val="accent1"/>
+          </a:effectRef>
+          <a:fontRef idx="minor">
+            <a:schemeClr val="lt1"/>
+          </a:fontRef>
+        </p:style>
+        <p:txBody>
+          <a:bodyPr rtlCol="0" anchor="ctr"/>
+          <a:lstStyle/>
+          <a:p>
+            <a:pPr algn="ctr"/>
+            <a:endParaRPr lang="en-US"/>
+          </a:p>
+        </p:txBody>
+      </p:sp>
+      <p:sp>
+        <p:nvSpPr>
+          <p:cNvPr id="23" name="Rounded Rectangle 22"/>
+          <p:cNvSpPr/>
+          <p:nvPr/>
+        </p:nvSpPr>
+        <p:spPr>
+          <a:xfrm>
+            <a:off x="892101" y="4801249"/>
+            <a:ext cx="2207564" cy="544259"/>
+          </a:xfrm>
+          <a:prstGeom prst="roundRect">
+            <a:avLst/>
+          </a:prstGeom>
+          <a:solidFill>
+            <a:schemeClr val="bg1"/>
+          </a:solidFill>
+          <a:ln>
+            <a:solidFill>
+              <a:srgbClr val="000000"/>
+            </a:solidFill>
+          </a:ln>
+        </p:spPr>
+        <p:style>
+          <a:lnRef idx="1">
+            <a:schemeClr val="accent1"/>
+          </a:lnRef>
+          <a:fillRef idx="3">
+            <a:schemeClr val="accent1"/>
+          </a:fillRef>
+          <a:effectRef idx="2">
+            <a:schemeClr val="accent1"/>
+          </a:effectRef>
+          <a:fontRef idx="minor">
+            <a:schemeClr val="lt1"/>
+          </a:fontRef>
+        </p:style>
+        <p:txBody>
+          <a:bodyPr rtlCol="0" anchor="ctr"/>
+          <a:lstStyle/>
+          <a:p>
+            <a:pPr algn="ctr"/>
+            <a:r>
+              <a:rPr lang="en-US" dirty="0" smtClean="0">
+                <a:solidFill>
+                  <a:schemeClr val="tx1"/>
+                </a:solidFill>
+              </a:rPr>
+              <a:t>Grid Metadata</a:t>
+            </a:r>
+            <a:endParaRPr lang="en-US" dirty="0">
+              <a:solidFill>
+                <a:schemeClr val="tx1"/>
+              </a:solidFill>
+            </a:endParaRPr>
+          </a:p>
+        </p:txBody>
+      </p:sp>
     </p:spTree>
     <p:extLst>
       <p:ext uri="{BB962C8B-B14F-4D97-AF65-F5344CB8AC3E}">
@@ -4364,6 +4465,13 @@
   <p:clrMapOvr>
     <a:masterClrMapping/>
   </p:clrMapOvr>
+  <p:timing>
+    <p:tnLst>
+      <p:par>
+        <p:cTn xmlns:p14="http://schemas.microsoft.com/office/powerpoint/2010/main" id="1" dur="indefinite" restart="never" nodeType="tmRoot"/>
+      </p:par>
+    </p:tnLst>
+  </p:timing>
 </p:sld>
 </file>
 

</xml_diff>